<commit_message>
interface add  user interface: Sample
</commit_message>
<xml_diff>
--- a/Work/올인원팀 발표자료_181021.pptx
+++ b/Work/올인원팀 발표자료_181021.pptx
@@ -4093,13 +4093,7 @@
               <a:rPr lang="en-US" altLang="ko-KR" sz="2400" b="1" dirty="0" smtClean="0">
                 <a:latin typeface="Century Gothic" panose="020B0502020202020204" pitchFamily="34" charset="0"/>
               </a:rPr>
-              <a:t>All-In-One </a:t>
-            </a:r>
-            <a:r>
-              <a:rPr lang="en-US" altLang="ko-KR" sz="2400" b="1" dirty="0" smtClean="0">
-                <a:latin typeface="Century Gothic" panose="020B0502020202020204" pitchFamily="34" charset="0"/>
-              </a:rPr>
-              <a:t>Team</a:t>
+              <a:t>All-In-One Team</a:t>
             </a:r>
             <a:endParaRPr lang="ko-KR" altLang="en-US" sz="2400" b="1" dirty="0">
               <a:latin typeface="Century Gothic" panose="020B0502020202020204" pitchFamily="34" charset="0"/>
@@ -7331,8 +7325,8 @@
         </p:nvSpPr>
         <p:spPr>
           <a:xfrm>
-            <a:off x="6145822" y="934570"/>
-            <a:ext cx="3951489" cy="2308324"/>
+            <a:off x="6182113" y="934570"/>
+            <a:ext cx="3951489" cy="3416320"/>
           </a:xfrm>
           <a:prstGeom prst="rect">
             <a:avLst/>
@@ -7445,7 +7439,56 @@
             </a:r>
             <a:r>
               <a:rPr lang="ko-KR" altLang="en-US" dirty="0" smtClean="0"/>
-              <a:t> 장치가 함</a:t>
+              <a:t> 장치가 </a:t>
+            </a:r>
+            <a:r>
+              <a:rPr lang="ko-KR" altLang="en-US" dirty="0" smtClean="0"/>
+              <a:t>함</a:t>
+            </a:r>
+            <a:endParaRPr lang="en-US" altLang="ko-KR" dirty="0" smtClean="0"/>
+          </a:p>
+          <a:p>
+            <a:endParaRPr lang="en-US" altLang="ko-KR" dirty="0"/>
+          </a:p>
+          <a:p>
+            <a:r>
+              <a:rPr lang="ko-KR" altLang="en-US" dirty="0" err="1" smtClean="0"/>
+              <a:t>올인원팀이</a:t>
+            </a:r>
+            <a:r>
+              <a:rPr lang="en-US" altLang="ko-KR" dirty="0" smtClean="0"/>
+              <a:t> </a:t>
+            </a:r>
+            <a:r>
+              <a:rPr lang="ko-KR" altLang="en-US" dirty="0" err="1" smtClean="0"/>
+              <a:t>하는일</a:t>
+            </a:r>
+            <a:r>
+              <a:rPr lang="ko-KR" altLang="en-US" dirty="0" smtClean="0"/>
+              <a:t> </a:t>
+            </a:r>
+            <a:endParaRPr lang="en-US" altLang="ko-KR" dirty="0" smtClean="0"/>
+          </a:p>
+          <a:p>
+            <a:pPr marL="285750" indent="-285750">
+              <a:buFontTx/>
+              <a:buChar char="-"/>
+            </a:pPr>
+            <a:r>
+              <a:rPr lang="en-US" altLang="ko-KR" dirty="0" smtClean="0"/>
+              <a:t>Sample prep </a:t>
+            </a:r>
+            <a:r>
+              <a:rPr lang="ko-KR" altLang="en-US" dirty="0" smtClean="0"/>
+              <a:t>과 </a:t>
+            </a:r>
+            <a:r>
+              <a:rPr lang="en-US" altLang="ko-KR" dirty="0" smtClean="0"/>
+              <a:t>sample interface </a:t>
+            </a:r>
+            <a:r>
+              <a:rPr lang="ko-KR" altLang="en-US" dirty="0" smtClean="0"/>
+              <a:t>개발</a:t>
             </a:r>
             <a:endParaRPr lang="en-US" altLang="ko-KR" dirty="0" smtClean="0"/>
           </a:p>

</xml_diff>

<commit_message>
Sample prep part update
</commit_message>
<xml_diff>
--- a/Work/올인원팀 발표자료_181021.pptx
+++ b/Work/올인원팀 발표자료_181021.pptx
@@ -208,7 +208,7 @@
           <a:p>
             <a:fld id="{8939D027-0A03-41F2-8107-7FDE036C3AC1}" type="datetimeFigureOut">
               <a:rPr lang="ko-KR" altLang="en-US" smtClean="0"/>
-              <a:t>2018-10-21</a:t>
+              <a:t>2018-10-22</a:t>
             </a:fld>
             <a:endParaRPr lang="ko-KR" altLang="en-US"/>
           </a:p>
@@ -570,13 +570,7 @@
               <a:rPr lang="ko-KR" altLang="en-US" sz="1200" dirty="0" smtClean="0">
                 <a:hlinkClick r:id="rId3"/>
               </a:rPr>
-              <a:t>https://</a:t>
-            </a:r>
-            <a:r>
-              <a:rPr lang="ko-KR" altLang="en-US" sz="1200" dirty="0" smtClean="0">
-                <a:hlinkClick r:id="rId3"/>
-              </a:rPr>
-              <a:t>en.oxforddictionaries.com/definition/all-in-one</a:t>
+              <a:t>https://en.oxforddictionaries.com/definition/all-in-one</a:t>
             </a:r>
             <a:endParaRPr lang="en-US" altLang="ko-KR" sz="1200" dirty="0" smtClean="0"/>
           </a:p>
@@ -829,7 +823,7 @@
           <a:p>
             <a:fld id="{5141A162-C651-4B4D-AE3C-7E59569DE8B4}" type="datetime1">
               <a:rPr lang="ko-KR" altLang="en-US" smtClean="0"/>
-              <a:t>2018-10-21</a:t>
+              <a:t>2018-10-22</a:t>
             </a:fld>
             <a:endParaRPr lang="ko-KR" altLang="en-US"/>
           </a:p>
@@ -1027,7 +1021,7 @@
           <a:p>
             <a:fld id="{7AC61149-9197-41B8-9A88-FC29B85327E8}" type="datetime1">
               <a:rPr lang="ko-KR" altLang="en-US" smtClean="0"/>
-              <a:t>2018-10-21</a:t>
+              <a:t>2018-10-22</a:t>
             </a:fld>
             <a:endParaRPr lang="ko-KR" altLang="en-US"/>
           </a:p>
@@ -1235,7 +1229,7 @@
           <a:p>
             <a:fld id="{10FF5CB0-9513-44C3-A2C1-15520EE002EF}" type="datetime1">
               <a:rPr lang="ko-KR" altLang="en-US" smtClean="0"/>
-              <a:t>2018-10-21</a:t>
+              <a:t>2018-10-22</a:t>
             </a:fld>
             <a:endParaRPr lang="ko-KR" altLang="en-US"/>
           </a:p>
@@ -1433,7 +1427,7 @@
           <a:p>
             <a:fld id="{D4D5DDFB-08D3-43F2-B7A4-62E1808F6770}" type="datetime1">
               <a:rPr lang="ko-KR" altLang="en-US" smtClean="0"/>
-              <a:t>2018-10-21</a:t>
+              <a:t>2018-10-22</a:t>
             </a:fld>
             <a:endParaRPr lang="ko-KR" altLang="en-US"/>
           </a:p>
@@ -1708,7 +1702,7 @@
           <a:p>
             <a:fld id="{FC1BC4AD-8276-41EA-94F9-C1CD6D3F8F86}" type="datetime1">
               <a:rPr lang="ko-KR" altLang="en-US" smtClean="0"/>
-              <a:t>2018-10-21</a:t>
+              <a:t>2018-10-22</a:t>
             </a:fld>
             <a:endParaRPr lang="ko-KR" altLang="en-US"/>
           </a:p>
@@ -1973,7 +1967,7 @@
           <a:p>
             <a:fld id="{956DAB52-14EE-4121-94DB-4DCA1AF5D129}" type="datetime1">
               <a:rPr lang="ko-KR" altLang="en-US" smtClean="0"/>
-              <a:t>2018-10-21</a:t>
+              <a:t>2018-10-22</a:t>
             </a:fld>
             <a:endParaRPr lang="ko-KR" altLang="en-US"/>
           </a:p>
@@ -2385,7 +2379,7 @@
           <a:p>
             <a:fld id="{2CE3EB99-74E3-49E2-96F6-3C10D2B6FC8B}" type="datetime1">
               <a:rPr lang="ko-KR" altLang="en-US" smtClean="0"/>
-              <a:t>2018-10-21</a:t>
+              <a:t>2018-10-22</a:t>
             </a:fld>
             <a:endParaRPr lang="ko-KR" altLang="en-US"/>
           </a:p>
@@ -2526,7 +2520,7 @@
           <a:p>
             <a:fld id="{75B26A83-3053-4834-9D6D-D866D98A946D}" type="datetime1">
               <a:rPr lang="ko-KR" altLang="en-US" smtClean="0"/>
-              <a:t>2018-10-21</a:t>
+              <a:t>2018-10-22</a:t>
             </a:fld>
             <a:endParaRPr lang="ko-KR" altLang="en-US"/>
           </a:p>
@@ -2639,7 +2633,7 @@
           <a:p>
             <a:fld id="{5A02C096-F5F9-4126-B5D9-70081C4EF774}" type="datetime1">
               <a:rPr lang="ko-KR" altLang="en-US" smtClean="0"/>
-              <a:t>2018-10-21</a:t>
+              <a:t>2018-10-22</a:t>
             </a:fld>
             <a:endParaRPr lang="ko-KR" altLang="en-US"/>
           </a:p>
@@ -2950,7 +2944,7 @@
           <a:p>
             <a:fld id="{039E44AD-50BA-4E3C-BC0B-670EBBF1DFE1}" type="datetime1">
               <a:rPr lang="ko-KR" altLang="en-US" smtClean="0"/>
-              <a:t>2018-10-21</a:t>
+              <a:t>2018-10-22</a:t>
             </a:fld>
             <a:endParaRPr lang="ko-KR" altLang="en-US"/>
           </a:p>
@@ -3238,7 +3232,7 @@
           <a:p>
             <a:fld id="{37460B2B-EDB3-4896-A932-A0180CE20FE3}" type="datetime1">
               <a:rPr lang="ko-KR" altLang="en-US" smtClean="0"/>
-              <a:t>2018-10-21</a:t>
+              <a:t>2018-10-22</a:t>
             </a:fld>
             <a:endParaRPr lang="ko-KR" altLang="en-US"/>
           </a:p>
@@ -3482,7 +3476,7 @@
           <a:p>
             <a:fld id="{E8EC0580-6EA2-4923-AE12-76A6309B16C5}" type="datetime1">
               <a:rPr lang="ko-KR" altLang="en-US" smtClean="0"/>
-              <a:t>2018-10-21</a:t>
+              <a:t>2018-10-22</a:t>
             </a:fld>
             <a:endParaRPr lang="ko-KR" altLang="en-US"/>
           </a:p>
@@ -6344,25 +6338,13 @@
               <a:rPr lang="en-US" altLang="ko-KR" b="1" dirty="0" smtClean="0">
                 <a:latin typeface="Century Gothic" panose="020B0502020202020204" pitchFamily="34" charset="0"/>
               </a:rPr>
-              <a:t>Reduce </a:t>
-            </a:r>
-            <a:r>
-              <a:rPr lang="en-US" altLang="ko-KR" b="1" dirty="0" smtClean="0">
-                <a:latin typeface="Century Gothic" panose="020B0502020202020204" pitchFamily="34" charset="0"/>
-              </a:rPr>
-              <a:t>Cost   </a:t>
+              <a:t>Reduce Cost   </a:t>
             </a:r>
             <a:r>
               <a:rPr lang="ko-KR" altLang="en-US" b="1" dirty="0" smtClean="0">
                 <a:latin typeface="Century Gothic" panose="020B0502020202020204" pitchFamily="34" charset="0"/>
               </a:rPr>
-              <a:t>비용 </a:t>
-            </a:r>
-            <a:r>
-              <a:rPr lang="ko-KR" altLang="en-US" b="1" dirty="0" smtClean="0">
-                <a:latin typeface="Century Gothic" panose="020B0502020202020204" pitchFamily="34" charset="0"/>
-              </a:rPr>
-              <a:t>절약</a:t>
+              <a:t>비용 절약</a:t>
             </a:r>
             <a:endParaRPr lang="en-US" altLang="ko-KR" b="1" dirty="0" smtClean="0">
               <a:latin typeface="Century Gothic" panose="020B0502020202020204" pitchFamily="34" charset="0"/>
@@ -8347,11 +8329,18 @@
           <a:lstStyle/>
           <a:p>
             <a:r>
+              <a:rPr lang="en-US" altLang="ko-KR" sz="3200" b="1" smtClean="0">
+                <a:latin typeface="Century Gothic" panose="020B0502020202020204" pitchFamily="34" charset="0"/>
+                <a:cs typeface="Arial" panose="020B0604020202020204" pitchFamily="34" charset="0"/>
+              </a:rPr>
+              <a:t>Sample Preparation </a:t>
+            </a:r>
+            <a:r>
               <a:rPr lang="en-US" altLang="ko-KR" sz="3200" b="1" dirty="0" smtClean="0">
                 <a:latin typeface="Century Gothic" panose="020B0502020202020204" pitchFamily="34" charset="0"/>
                 <a:cs typeface="Arial" panose="020B0604020202020204" pitchFamily="34" charset="0"/>
               </a:rPr>
-              <a:t>For Sample Prep Components</a:t>
+              <a:t>Components</a:t>
             </a:r>
             <a:endParaRPr lang="ko-KR" altLang="en-US" sz="3200" b="1" dirty="0">
               <a:latin typeface="Century Gothic" panose="020B0502020202020204" pitchFamily="34" charset="0"/>
@@ -9613,11 +9602,7 @@
             </a:r>
             <a:r>
               <a:rPr lang="ko-KR" altLang="en-US" dirty="0" smtClean="0"/>
-              <a:t>얼마나 </a:t>
-            </a:r>
-            <a:r>
-              <a:rPr lang="ko-KR" altLang="en-US" dirty="0" smtClean="0"/>
-              <a:t>있다</a:t>
+              <a:t>얼마나 있다</a:t>
             </a:r>
             <a:endParaRPr lang="en-US" altLang="ko-KR" dirty="0" smtClean="0"/>
           </a:p>

</xml_diff>